<commit_message>
typos in Examples/0-4-4-other-nats and Slides/L4.2 fixed
</commit_message>
<xml_diff>
--- a/Slides/Lesson 4.2 The Observer Template for List Data.pptx
+++ b/Slides/Lesson 4.2 The Observer Template for List Data.pptx
@@ -222,6 +222,10 @@
 </p:presentation>
 </file>
 
+<file path=ppt/revisionInfo.xml><?xml version="1.0" encoding="utf-8"?>
+<p1510:revInfo xmlns:a="http://schemas.openxmlformats.org/drawingml/2006/main" xmlns:r="http://schemas.openxmlformats.org/officeDocument/2006/relationships" xmlns:p1510="http://schemas.microsoft.com/office/powerpoint/2015/10/main"/>
+</file>
+
 <file path=ppt/notesMasters/notesMaster1.xml><?xml version="1.0" encoding="utf-8"?>
 <p:notesMaster xmlns:a="http://schemas.openxmlformats.org/drawingml/2006/main" xmlns:r="http://schemas.openxmlformats.org/officeDocument/2006/relationships" xmlns:p="http://schemas.openxmlformats.org/presentationml/2006/main">
   <p:cSld>
@@ -305,7 +309,7 @@
             <a:fld id="{CF8F25F6-E1EF-4065-8525-42EDEBD9BD22}" type="datetimeFigureOut">
               <a:rPr lang="en-US" smtClean="0"/>
               <a:pPr/>
-              <a:t>8/11/2017</a:t>
+              <a:t>10/3/2017</a:t>
             </a:fld>
             <a:endParaRPr lang="en-US"/>
           </a:p>
@@ -841,7 +845,7 @@
           <a:p>
             <a:fld id="{2F1F79F5-7BEC-496A-AFC7-876E38F64D71}" type="datetime1">
               <a:rPr lang="en-US" smtClean="0"/>
-              <a:t>8/11/2017</a:t>
+              <a:t>10/3/2017</a:t>
             </a:fld>
             <a:endParaRPr lang="en-US"/>
           </a:p>
@@ -936,7 +940,7 @@
           <a:p>
             <a:fld id="{0A05703A-7669-4FEA-9056-25299B4D29D4}" type="datetime1">
               <a:rPr lang="en-US" smtClean="0"/>
-              <a:t>8/11/2017</a:t>
+              <a:t>10/3/2017</a:t>
             </a:fld>
             <a:endParaRPr lang="en-US"/>
           </a:p>
@@ -1211,7 +1215,7 @@
           <a:p>
             <a:fld id="{6E5077B5-BB57-49DB-88CA-226A139E5C01}" type="datetime1">
               <a:rPr lang="en-US" smtClean="0"/>
-              <a:t>8/11/2017</a:t>
+              <a:t>10/3/2017</a:t>
             </a:fld>
             <a:endParaRPr lang="en-US"/>
           </a:p>
@@ -1463,7 +1467,7 @@
           <a:p>
             <a:fld id="{C48D9447-CBD6-49A1-89FD-8512A8CF8999}" type="datetime1">
               <a:rPr lang="en-US" smtClean="0"/>
-              <a:t>8/11/2017</a:t>
+              <a:t>10/3/2017</a:t>
             </a:fld>
             <a:endParaRPr lang="en-US"/>
           </a:p>
@@ -1631,7 +1635,7 @@
           <a:p>
             <a:fld id="{A3639A2A-823D-48B7-9ACE-7FAF42870BA9}" type="datetime1">
               <a:rPr lang="en-US" smtClean="0"/>
-              <a:t>8/11/2017</a:t>
+              <a:t>10/3/2017</a:t>
             </a:fld>
             <a:endParaRPr lang="en-US"/>
           </a:p>
@@ -1809,7 +1813,7 @@
           <a:p>
             <a:fld id="{ED1B6996-82E9-463C-972C-7B56056E426C}" type="datetime1">
               <a:rPr lang="en-US" smtClean="0"/>
-              <a:t>8/11/2017</a:t>
+              <a:t>10/3/2017</a:t>
             </a:fld>
             <a:endParaRPr lang="en-US"/>
           </a:p>
@@ -1983,7 +1987,7 @@
           <a:p>
             <a:fld id="{E22ED4DA-448D-4BB1-B935-CC112220207B}" type="datetime1">
               <a:rPr lang="en-US" smtClean="0"/>
-              <a:t>8/11/2017</a:t>
+              <a:t>10/3/2017</a:t>
             </a:fld>
             <a:endParaRPr lang="en-US"/>
           </a:p>
@@ -2156,7 +2160,7 @@
           <a:p>
             <a:fld id="{E22ED4DA-448D-4BB1-B935-CC112220207B}" type="datetime1">
               <a:rPr lang="en-US" smtClean="0"/>
-              <a:t>8/11/2017</a:t>
+              <a:t>10/3/2017</a:t>
             </a:fld>
             <a:endParaRPr lang="en-US"/>
           </a:p>
@@ -2416,7 +2420,7 @@
           <a:p>
             <a:fld id="{FF5D65A6-AB94-4435-B0B7-3743215FA46C}" type="datetime1">
               <a:rPr lang="en-US" smtClean="0"/>
-              <a:t>8/11/2017</a:t>
+              <a:t>10/3/2017</a:t>
             </a:fld>
             <a:endParaRPr lang="en-US"/>
           </a:p>
@@ -2592,7 +2596,7 @@
           <a:p>
             <a:fld id="{FF5D65A6-AB94-4435-B0B7-3743215FA46C}" type="datetime1">
               <a:rPr lang="en-US" smtClean="0"/>
-              <a:t>8/11/2017</a:t>
+              <a:t>10/3/2017</a:t>
             </a:fld>
             <a:endParaRPr lang="en-US"/>
           </a:p>
@@ -2886,7 +2890,7 @@
           <a:p>
             <a:fld id="{7C193DC4-6EF0-48C9-B29C-616106A645E1}" type="datetime1">
               <a:rPr lang="en-US" smtClean="0"/>
-              <a:t>8/11/2017</a:t>
+              <a:t>10/3/2017</a:t>
             </a:fld>
             <a:endParaRPr lang="en-US"/>
           </a:p>
@@ -3171,7 +3175,7 @@
           <a:p>
             <a:fld id="{5D1846AD-9252-4647-9435-4C2AC365653A}" type="datetime1">
               <a:rPr lang="en-US" smtClean="0"/>
-              <a:t>8/11/2017</a:t>
+              <a:t>10/3/2017</a:t>
             </a:fld>
             <a:endParaRPr lang="en-US"/>
           </a:p>
@@ -3590,7 +3594,7 @@
           <a:p>
             <a:fld id="{CE56DC10-3561-4063-A6AF-C1CC7A41040A}" type="datetime1">
               <a:rPr lang="en-US" smtClean="0"/>
-              <a:t>8/11/2017</a:t>
+              <a:t>10/3/2017</a:t>
             </a:fld>
             <a:endParaRPr lang="en-US"/>
           </a:p>
@@ -3707,7 +3711,7 @@
           <a:p>
             <a:fld id="{2F7B77F5-1464-4F6B-92A8-64FC8A508293}" type="datetime1">
               <a:rPr lang="en-US" smtClean="0"/>
-              <a:t>8/11/2017</a:t>
+              <a:t>10/3/2017</a:t>
             </a:fld>
             <a:endParaRPr lang="en-US"/>
           </a:p>
@@ -3930,7 +3934,7 @@
           <a:p>
             <a:fld id="{02B3F677-983B-48DB-ADFD-63FE6CBC7FB2}" type="datetime1">
               <a:rPr lang="en-US" smtClean="0"/>
-              <a:t>8/11/2017</a:t>
+              <a:t>10/3/2017</a:t>
             </a:fld>
             <a:endParaRPr lang="en-US"/>
           </a:p>
@@ -20143,7 +20147,7 @@
                 <a:latin typeface="Consolas" pitchFamily="49" charset="0"/>
                 <a:cs typeface="Consolas" pitchFamily="49" charset="0"/>
               </a:rPr>
-              <a:t>[</a:t>
+              <a:t>[else </a:t>
             </a:r>
             <a:r>
               <a:rPr lang="en-US" sz="2000" b="1" dirty="0">
@@ -20190,7 +20194,7 @@
                 <a:latin typeface="Consolas" pitchFamily="49" charset="0"/>
                 <a:cs typeface="Consolas" pitchFamily="49" charset="0"/>
               </a:rPr>
-              <a:t>           </a:t>
+              <a:t>                </a:t>
             </a:r>
             <a:r>
               <a:rPr lang="en-US" sz="2000" b="1" dirty="0">
@@ -20319,95 +20323,6 @@
   <p:clrMapOvr>
     <a:masterClrMapping/>
   </p:clrMapOvr>
-  <p:timing>
-    <p:tnLst>
-      <p:par>
-        <p:cTn id="1" dur="indefinite" restart="never" nodeType="tmRoot">
-          <p:childTnLst>
-            <p:seq concurrent="1" nextAc="seek">
-              <p:cTn id="2" dur="indefinite" nodeType="mainSeq">
-                <p:childTnLst>
-                  <p:par>
-                    <p:cTn id="3" fill="hold">
-                      <p:stCondLst>
-                        <p:cond delay="indefinite"/>
-                        <p:cond evt="onBegin" delay="0">
-                          <p:tn val="2"/>
-                        </p:cond>
-                      </p:stCondLst>
-                      <p:childTnLst>
-                        <p:par>
-                          <p:cTn id="4" fill="hold">
-                            <p:stCondLst>
-                              <p:cond delay="0"/>
-                            </p:stCondLst>
-                            <p:childTnLst>
-                              <p:par>
-                                <p:cTn id="5" presetID="10" presetClass="entr" presetSubtype="0" fill="hold" grpId="0" nodeType="withEffect">
-                                  <p:stCondLst>
-                                    <p:cond delay="0"/>
-                                  </p:stCondLst>
-                                  <p:childTnLst>
-                                    <p:set>
-                                      <p:cBhvr>
-                                        <p:cTn id="6" dur="1" fill="hold">
-                                          <p:stCondLst>
-                                            <p:cond delay="0"/>
-                                          </p:stCondLst>
-                                        </p:cTn>
-                                        <p:tgtEl>
-                                          <p:spTgt spid="20"/>
-                                        </p:tgtEl>
-                                        <p:attrNameLst>
-                                          <p:attrName>style.visibility</p:attrName>
-                                        </p:attrNameLst>
-                                      </p:cBhvr>
-                                      <p:to>
-                                        <p:strVal val="visible"/>
-                                      </p:to>
-                                    </p:set>
-                                    <p:animEffect transition="in" filter="fade">
-                                      <p:cBhvr>
-                                        <p:cTn id="7" dur="500"/>
-                                        <p:tgtEl>
-                                          <p:spTgt spid="20"/>
-                                        </p:tgtEl>
-                                      </p:cBhvr>
-                                    </p:animEffect>
-                                  </p:childTnLst>
-                                </p:cTn>
-                              </p:par>
-                            </p:childTnLst>
-                          </p:cTn>
-                        </p:par>
-                      </p:childTnLst>
-                    </p:cTn>
-                  </p:par>
-                </p:childTnLst>
-              </p:cTn>
-              <p:prevCondLst>
-                <p:cond evt="onPrev" delay="0">
-                  <p:tgtEl>
-                    <p:sldTgt/>
-                  </p:tgtEl>
-                </p:cond>
-              </p:prevCondLst>
-              <p:nextCondLst>
-                <p:cond evt="onNext" delay="0">
-                  <p:tgtEl>
-                    <p:sldTgt/>
-                  </p:tgtEl>
-                </p:cond>
-              </p:nextCondLst>
-            </p:seq>
-          </p:childTnLst>
-        </p:cTn>
-      </p:par>
-    </p:tnLst>
-    <p:bldLst>
-      <p:bldP spid="20" grpId="0"/>
-    </p:bldLst>
-  </p:timing>
 </p:sld>
 </file>
 
@@ -21019,7 +20934,7 @@
                 <a:latin typeface="Consolas" pitchFamily="49" charset="0"/>
                 <a:cs typeface="Consolas" pitchFamily="49" charset="0"/>
               </a:rPr>
-              <a:t>(</a:t>
+              <a:t>  (</a:t>
             </a:r>
             <a:r>
               <a:rPr lang="en-US" sz="2400" b="1" dirty="0">
@@ -21106,7 +21021,21 @@
                 <a:latin typeface="Consolas" pitchFamily="49" charset="0"/>
                 <a:cs typeface="Consolas" pitchFamily="49" charset="0"/>
               </a:rPr>
-              <a:t>= (cons 11 (cons 22 (cons 27 (cons 33 empty))))</a:t>
+              <a:t>= (cons 11 (cons 22 (cons </a:t>
+            </a:r>
+            <a:r>
+              <a:rPr lang="en-US" sz="2400" b="1">
+                <a:latin typeface="Consolas" pitchFamily="49" charset="0"/>
+                <a:cs typeface="Consolas" pitchFamily="49" charset="0"/>
+              </a:rPr>
+              <a:t>27   (</a:t>
+            </a:r>
+            <a:r>
+              <a:rPr lang="en-US" sz="2400" b="1" dirty="0">
+                <a:latin typeface="Consolas" pitchFamily="49" charset="0"/>
+                <a:cs typeface="Consolas" pitchFamily="49" charset="0"/>
+              </a:rPr>
+              <a:t>cons 33 empty))))</a:t>
             </a:r>
           </a:p>
         </p:txBody>

</xml_diff>